<commit_message>
New img updated in ppt file
</commit_message>
<xml_diff>
--- a/img/Basic-concept.pptx
+++ b/img/Basic-concept.pptx
@@ -7,6 +7,9 @@
   <p:sldIdLst>
     <p:sldId id="256" r:id="rId2"/>
     <p:sldId id="257" r:id="rId3"/>
+    <p:sldId id="258" r:id="rId4"/>
+    <p:sldId id="259" r:id="rId5"/>
+    <p:sldId id="260" r:id="rId6"/>
   </p:sldIdLst>
   <p:sldSz cx="12192000" cy="6858000"/>
   <p:notesSz cx="6858000" cy="9144000"/>
@@ -105,6 +108,11 @@
       </a:defRPr>
     </a:lvl9pPr>
   </p:defaultTextStyle>
+  <p:extLst>
+    <p:ext uri="{EFAFB233-063F-42B5-8137-9DF3F51BA10A}">
+      <p15:sldGuideLst xmlns:p15="http://schemas.microsoft.com/office/powerpoint/2012/main"/>
+    </p:ext>
+  </p:extLst>
 </p:presentation>
 </file>
 
@@ -239,7 +247,7 @@
           <a:p>
             <a:fld id="{4BEDA2D3-499C-4693-89B9-5904003EA4C1}" type="datetimeFigureOut">
               <a:rPr lang="ko-KR" altLang="en-US" smtClean="0"/>
-              <a:t>2019-06-05</a:t>
+              <a:t>2019-06-14</a:t>
             </a:fld>
             <a:endParaRPr lang="ko-KR" altLang="en-US"/>
           </a:p>
@@ -409,7 +417,7 @@
           <a:p>
             <a:fld id="{4BEDA2D3-499C-4693-89B9-5904003EA4C1}" type="datetimeFigureOut">
               <a:rPr lang="ko-KR" altLang="en-US" smtClean="0"/>
-              <a:t>2019-06-05</a:t>
+              <a:t>2019-06-14</a:t>
             </a:fld>
             <a:endParaRPr lang="ko-KR" altLang="en-US"/>
           </a:p>
@@ -589,7 +597,7 @@
           <a:p>
             <a:fld id="{4BEDA2D3-499C-4693-89B9-5904003EA4C1}" type="datetimeFigureOut">
               <a:rPr lang="ko-KR" altLang="en-US" smtClean="0"/>
-              <a:t>2019-06-05</a:t>
+              <a:t>2019-06-14</a:t>
             </a:fld>
             <a:endParaRPr lang="ko-KR" altLang="en-US"/>
           </a:p>
@@ -759,7 +767,7 @@
           <a:p>
             <a:fld id="{4BEDA2D3-499C-4693-89B9-5904003EA4C1}" type="datetimeFigureOut">
               <a:rPr lang="ko-KR" altLang="en-US" smtClean="0"/>
-              <a:t>2019-06-05</a:t>
+              <a:t>2019-06-14</a:t>
             </a:fld>
             <a:endParaRPr lang="ko-KR" altLang="en-US"/>
           </a:p>
@@ -1005,7 +1013,7 @@
           <a:p>
             <a:fld id="{4BEDA2D3-499C-4693-89B9-5904003EA4C1}" type="datetimeFigureOut">
               <a:rPr lang="ko-KR" altLang="en-US" smtClean="0"/>
-              <a:t>2019-06-05</a:t>
+              <a:t>2019-06-14</a:t>
             </a:fld>
             <a:endParaRPr lang="ko-KR" altLang="en-US"/>
           </a:p>
@@ -1237,7 +1245,7 @@
           <a:p>
             <a:fld id="{4BEDA2D3-499C-4693-89B9-5904003EA4C1}" type="datetimeFigureOut">
               <a:rPr lang="ko-KR" altLang="en-US" smtClean="0"/>
-              <a:t>2019-06-05</a:t>
+              <a:t>2019-06-14</a:t>
             </a:fld>
             <a:endParaRPr lang="ko-KR" altLang="en-US"/>
           </a:p>
@@ -1604,7 +1612,7 @@
           <a:p>
             <a:fld id="{4BEDA2D3-499C-4693-89B9-5904003EA4C1}" type="datetimeFigureOut">
               <a:rPr lang="ko-KR" altLang="en-US" smtClean="0"/>
-              <a:t>2019-06-05</a:t>
+              <a:t>2019-06-14</a:t>
             </a:fld>
             <a:endParaRPr lang="ko-KR" altLang="en-US"/>
           </a:p>
@@ -1722,7 +1730,7 @@
           <a:p>
             <a:fld id="{4BEDA2D3-499C-4693-89B9-5904003EA4C1}" type="datetimeFigureOut">
               <a:rPr lang="ko-KR" altLang="en-US" smtClean="0"/>
-              <a:t>2019-06-05</a:t>
+              <a:t>2019-06-14</a:t>
             </a:fld>
             <a:endParaRPr lang="ko-KR" altLang="en-US"/>
           </a:p>
@@ -1817,7 +1825,7 @@
           <a:p>
             <a:fld id="{4BEDA2D3-499C-4693-89B9-5904003EA4C1}" type="datetimeFigureOut">
               <a:rPr lang="ko-KR" altLang="en-US" smtClean="0"/>
-              <a:t>2019-06-05</a:t>
+              <a:t>2019-06-14</a:t>
             </a:fld>
             <a:endParaRPr lang="ko-KR" altLang="en-US"/>
           </a:p>
@@ -2094,7 +2102,7 @@
           <a:p>
             <a:fld id="{4BEDA2D3-499C-4693-89B9-5904003EA4C1}" type="datetimeFigureOut">
               <a:rPr lang="ko-KR" altLang="en-US" smtClean="0"/>
-              <a:t>2019-06-05</a:t>
+              <a:t>2019-06-14</a:t>
             </a:fld>
             <a:endParaRPr lang="ko-KR" altLang="en-US"/>
           </a:p>
@@ -2347,7 +2355,7 @@
           <a:p>
             <a:fld id="{4BEDA2D3-499C-4693-89B9-5904003EA4C1}" type="datetimeFigureOut">
               <a:rPr lang="ko-KR" altLang="en-US" smtClean="0"/>
-              <a:t>2019-06-05</a:t>
+              <a:t>2019-06-14</a:t>
             </a:fld>
             <a:endParaRPr lang="ko-KR" altLang="en-US"/>
           </a:p>
@@ -2560,7 +2568,7 @@
           <a:p>
             <a:fld id="{4BEDA2D3-499C-4693-89B9-5904003EA4C1}" type="datetimeFigureOut">
               <a:rPr lang="ko-KR" altLang="en-US" smtClean="0"/>
-              <a:t>2019-06-05</a:t>
+              <a:t>2019-06-14</a:t>
             </a:fld>
             <a:endParaRPr lang="ko-KR" altLang="en-US"/>
           </a:p>
@@ -3153,8 +3161,8 @@
             </a:p>
           </p:txBody>
         </p:sp>
-        <mc:AlternateContent xmlns:mc="http://schemas.openxmlformats.org/markup-compatibility/2006">
-          <mc:Choice xmlns:a14="http://schemas.microsoft.com/office/drawing/2010/main" Requires="a14">
+        <mc:AlternateContent xmlns:mc="http://schemas.openxmlformats.org/markup-compatibility/2006" xmlns:a14="http://schemas.microsoft.com/office/drawing/2010/main">
+          <mc:Choice Requires="a14">
             <p:sp>
               <p:nvSpPr>
                 <p:cNvPr id="9" name="직사각형 8"/>
@@ -3242,7 +3250,7 @@
               </p:txBody>
             </p:sp>
           </mc:Choice>
-          <mc:Fallback>
+          <mc:Fallback xmlns="">
             <p:sp>
               <p:nvSpPr>
                 <p:cNvPr id="9" name="직사각형 8"/>
@@ -3344,8 +3352,8 @@
             </a:p>
           </p:txBody>
         </p:sp>
-        <mc:AlternateContent xmlns:mc="http://schemas.openxmlformats.org/markup-compatibility/2006">
-          <mc:Choice xmlns:a14="http://schemas.microsoft.com/office/drawing/2010/main" Requires="a14">
+        <mc:AlternateContent xmlns:mc="http://schemas.openxmlformats.org/markup-compatibility/2006" xmlns:a14="http://schemas.microsoft.com/office/drawing/2010/main">
+          <mc:Choice Requires="a14">
             <p:sp>
               <p:nvSpPr>
                 <p:cNvPr id="11" name="순서도: 판단 10"/>
@@ -3478,7 +3486,7 @@
               </p:txBody>
             </p:sp>
           </mc:Choice>
-          <mc:Fallback>
+          <mc:Fallback xmlns="">
             <p:sp>
               <p:nvSpPr>
                 <p:cNvPr id="11" name="순서도: 판단 10"/>
@@ -3588,11 +3596,7 @@
               <a:pPr algn="ctr"/>
               <a:r>
                 <a:rPr lang="en-US" altLang="ko-KR" dirty="0" smtClean="0"/>
-                <a:t>Yes : </a:t>
-              </a:r>
-              <a:r>
-                <a:rPr lang="en-US" altLang="ko-KR" dirty="0" smtClean="0"/>
-                <a:t>success</a:t>
+                <a:t>Yes : success</a:t>
               </a:r>
               <a:endParaRPr lang="ko-KR" altLang="en-US" dirty="0" smtClean="0"/>
             </a:p>
@@ -6375,6 +6379,1909 @@
       </p:par>
     </p:tnLst>
   </p:timing>
+</p:sld>
+</file>
+
+<file path=ppt/slides/slide3.xml><?xml version="1.0" encoding="utf-8"?>
+<p:sld xmlns:a="http://schemas.openxmlformats.org/drawingml/2006/main" xmlns:r="http://schemas.openxmlformats.org/officeDocument/2006/relationships" xmlns:p="http://schemas.openxmlformats.org/presentationml/2006/main">
+  <p:cSld>
+    <p:spTree>
+      <p:nvGrpSpPr>
+        <p:cNvPr id="1" name=""/>
+        <p:cNvGrpSpPr/>
+        <p:nvPr/>
+      </p:nvGrpSpPr>
+      <p:grpSpPr>
+        <a:xfrm>
+          <a:off x="0" y="0"/>
+          <a:ext cx="0" cy="0"/>
+          <a:chOff x="0" y="0"/>
+          <a:chExt cx="0" cy="0"/>
+        </a:xfrm>
+      </p:grpSpPr>
+      <p:grpSp>
+        <p:nvGrpSpPr>
+          <p:cNvPr id="37" name="그룹 36"/>
+          <p:cNvGrpSpPr/>
+          <p:nvPr/>
+        </p:nvGrpSpPr>
+        <p:grpSpPr>
+          <a:xfrm>
+            <a:off x="906451" y="993913"/>
+            <a:ext cx="9955032" cy="4691269"/>
+            <a:chOff x="906451" y="993913"/>
+            <a:chExt cx="9955032" cy="4691269"/>
+          </a:xfrm>
+        </p:grpSpPr>
+        <p:sp>
+          <p:nvSpPr>
+            <p:cNvPr id="4" name="직사각형 3"/>
+            <p:cNvSpPr/>
+            <p:nvPr/>
+          </p:nvSpPr>
+          <p:spPr>
+            <a:xfrm>
+              <a:off x="8285261" y="2767054"/>
+              <a:ext cx="2576222" cy="993913"/>
+            </a:xfrm>
+            <a:prstGeom prst="rect">
+              <a:avLst/>
+            </a:prstGeom>
+            <a:noFill/>
+            <a:ln>
+              <a:solidFill>
+                <a:schemeClr val="tx1"/>
+              </a:solidFill>
+            </a:ln>
+          </p:spPr>
+          <p:style>
+            <a:lnRef idx="2">
+              <a:schemeClr val="accent1">
+                <a:shade val="50000"/>
+              </a:schemeClr>
+            </a:lnRef>
+            <a:fillRef idx="1">
+              <a:schemeClr val="accent1"/>
+            </a:fillRef>
+            <a:effectRef idx="0">
+              <a:schemeClr val="accent1"/>
+            </a:effectRef>
+            <a:fontRef idx="minor">
+              <a:schemeClr val="lt1"/>
+            </a:fontRef>
+          </p:style>
+          <p:txBody>
+            <a:bodyPr rtlCol="0" anchor="ctr"/>
+            <a:lstStyle/>
+            <a:p>
+              <a:pPr algn="ctr"/>
+              <a:r>
+                <a:rPr lang="en-US" altLang="ko-KR" dirty="0" smtClean="0">
+                  <a:solidFill>
+                    <a:schemeClr val="tx1"/>
+                  </a:solidFill>
+                </a:rPr>
+                <a:t>LDPC decoder</a:t>
+              </a:r>
+              <a:endParaRPr lang="ko-KR" altLang="en-US" dirty="0">
+                <a:solidFill>
+                  <a:schemeClr val="tx1"/>
+                </a:solidFill>
+              </a:endParaRPr>
+            </a:p>
+          </p:txBody>
+        </p:sp>
+        <p:sp>
+          <p:nvSpPr>
+            <p:cNvPr id="5" name="직사각형 4"/>
+            <p:cNvSpPr/>
+            <p:nvPr/>
+          </p:nvSpPr>
+          <p:spPr>
+            <a:xfrm>
+              <a:off x="906451" y="2767054"/>
+              <a:ext cx="2576222" cy="993913"/>
+            </a:xfrm>
+            <a:prstGeom prst="rect">
+              <a:avLst/>
+            </a:prstGeom>
+            <a:noFill/>
+            <a:ln>
+              <a:solidFill>
+                <a:schemeClr val="tx1"/>
+              </a:solidFill>
+            </a:ln>
+          </p:spPr>
+          <p:style>
+            <a:lnRef idx="2">
+              <a:schemeClr val="accent1">
+                <a:shade val="50000"/>
+              </a:schemeClr>
+            </a:lnRef>
+            <a:fillRef idx="1">
+              <a:schemeClr val="accent1"/>
+            </a:fillRef>
+            <a:effectRef idx="0">
+              <a:schemeClr val="accent1"/>
+            </a:effectRef>
+            <a:fontRef idx="minor">
+              <a:schemeClr val="lt1"/>
+            </a:fontRef>
+          </p:style>
+          <p:txBody>
+            <a:bodyPr rtlCol="0" anchor="ctr"/>
+            <a:lstStyle/>
+            <a:p>
+              <a:pPr algn="ctr"/>
+              <a:r>
+                <a:rPr lang="en-US" altLang="ko-KR" dirty="0" smtClean="0">
+                  <a:solidFill>
+                    <a:schemeClr val="tx1"/>
+                  </a:solidFill>
+                </a:rPr>
+                <a:t>Bitcoin</a:t>
+              </a:r>
+              <a:endParaRPr lang="ko-KR" altLang="en-US" dirty="0">
+                <a:solidFill>
+                  <a:schemeClr val="tx1"/>
+                </a:solidFill>
+              </a:endParaRPr>
+            </a:p>
+          </p:txBody>
+        </p:sp>
+        <p:sp>
+          <p:nvSpPr>
+            <p:cNvPr id="7" name="직사각형 6"/>
+            <p:cNvSpPr/>
+            <p:nvPr/>
+          </p:nvSpPr>
+          <p:spPr>
+            <a:xfrm>
+              <a:off x="4834392" y="4683318"/>
+              <a:ext cx="2297927" cy="1001864"/>
+            </a:xfrm>
+            <a:prstGeom prst="rect">
+              <a:avLst/>
+            </a:prstGeom>
+            <a:noFill/>
+            <a:ln>
+              <a:solidFill>
+                <a:schemeClr val="tx1"/>
+              </a:solidFill>
+            </a:ln>
+          </p:spPr>
+          <p:style>
+            <a:lnRef idx="2">
+              <a:schemeClr val="accent1">
+                <a:shade val="50000"/>
+              </a:schemeClr>
+            </a:lnRef>
+            <a:fillRef idx="1">
+              <a:schemeClr val="accent1"/>
+            </a:fillRef>
+            <a:effectRef idx="0">
+              <a:schemeClr val="accent1"/>
+            </a:effectRef>
+            <a:fontRef idx="minor">
+              <a:schemeClr val="lt1"/>
+            </a:fontRef>
+          </p:style>
+          <p:txBody>
+            <a:bodyPr rtlCol="0" anchor="ctr"/>
+            <a:lstStyle/>
+            <a:p>
+              <a:pPr algn="ctr"/>
+              <a:r>
+                <a:rPr lang="en-US" altLang="ko-KR" dirty="0" smtClean="0">
+                  <a:solidFill>
+                    <a:schemeClr val="tx1"/>
+                  </a:solidFill>
+                </a:rPr>
+                <a:t>Convert parameters</a:t>
+              </a:r>
+            </a:p>
+            <a:p>
+              <a:pPr algn="ctr"/>
+              <a:r>
+                <a:rPr lang="en-US" altLang="ko-KR" dirty="0" smtClean="0">
+                  <a:solidFill>
+                    <a:schemeClr val="tx1"/>
+                  </a:solidFill>
+                </a:rPr>
+                <a:t>Bitcoin -&gt; LDPC</a:t>
+              </a:r>
+              <a:endParaRPr lang="ko-KR" altLang="en-US" dirty="0">
+                <a:solidFill>
+                  <a:schemeClr val="tx1"/>
+                </a:solidFill>
+              </a:endParaRPr>
+            </a:p>
+          </p:txBody>
+        </p:sp>
+        <p:sp>
+          <p:nvSpPr>
+            <p:cNvPr id="8" name="직사각형 7"/>
+            <p:cNvSpPr/>
+            <p:nvPr/>
+          </p:nvSpPr>
+          <p:spPr>
+            <a:xfrm>
+              <a:off x="4834392" y="993913"/>
+              <a:ext cx="2297927" cy="1001864"/>
+            </a:xfrm>
+            <a:prstGeom prst="rect">
+              <a:avLst/>
+            </a:prstGeom>
+            <a:noFill/>
+            <a:ln>
+              <a:solidFill>
+                <a:schemeClr val="tx1"/>
+              </a:solidFill>
+            </a:ln>
+          </p:spPr>
+          <p:style>
+            <a:lnRef idx="2">
+              <a:schemeClr val="accent1">
+                <a:shade val="50000"/>
+              </a:schemeClr>
+            </a:lnRef>
+            <a:fillRef idx="1">
+              <a:schemeClr val="accent1"/>
+            </a:fillRef>
+            <a:effectRef idx="0">
+              <a:schemeClr val="accent1"/>
+            </a:effectRef>
+            <a:fontRef idx="minor">
+              <a:schemeClr val="lt1"/>
+            </a:fontRef>
+          </p:style>
+          <p:txBody>
+            <a:bodyPr rtlCol="0" anchor="ctr"/>
+            <a:lstStyle/>
+            <a:p>
+              <a:pPr algn="ctr"/>
+              <a:r>
+                <a:rPr lang="en-US" altLang="ko-KR" dirty="0" smtClean="0">
+                  <a:solidFill>
+                    <a:schemeClr val="tx1"/>
+                  </a:solidFill>
+                </a:rPr>
+                <a:t>Convert outputs</a:t>
+              </a:r>
+            </a:p>
+            <a:p>
+              <a:pPr algn="ctr"/>
+              <a:r>
+                <a:rPr lang="en-US" altLang="ko-KR" dirty="0" smtClean="0">
+                  <a:solidFill>
+                    <a:schemeClr val="tx1"/>
+                  </a:solidFill>
+                </a:rPr>
+                <a:t>LDPC -&gt; Bitcoin</a:t>
+              </a:r>
+              <a:endParaRPr lang="ko-KR" altLang="en-US" dirty="0">
+                <a:solidFill>
+                  <a:schemeClr val="tx1"/>
+                </a:solidFill>
+              </a:endParaRPr>
+            </a:p>
+          </p:txBody>
+        </p:sp>
+        <p:cxnSp>
+          <p:nvCxnSpPr>
+            <p:cNvPr id="10" name="꺾인 연결선 9"/>
+            <p:cNvCxnSpPr>
+              <a:stCxn id="5" idx="2"/>
+              <a:endCxn id="7" idx="1"/>
+            </p:cNvCxnSpPr>
+            <p:nvPr/>
+          </p:nvCxnSpPr>
+          <p:spPr>
+            <a:xfrm rot="16200000" flipH="1">
+              <a:off x="2802836" y="3152693"/>
+              <a:ext cx="1423283" cy="2639830"/>
+            </a:xfrm>
+            <a:prstGeom prst="bentConnector2">
+              <a:avLst/>
+            </a:prstGeom>
+            <a:ln w="12700">
+              <a:tailEnd type="triangle"/>
+            </a:ln>
+          </p:spPr>
+          <p:style>
+            <a:lnRef idx="1">
+              <a:schemeClr val="dk1"/>
+            </a:lnRef>
+            <a:fillRef idx="0">
+              <a:schemeClr val="dk1"/>
+            </a:fillRef>
+            <a:effectRef idx="0">
+              <a:schemeClr val="dk1"/>
+            </a:effectRef>
+            <a:fontRef idx="minor">
+              <a:schemeClr val="tx1"/>
+            </a:fontRef>
+          </p:style>
+        </p:cxnSp>
+        <p:cxnSp>
+          <p:nvCxnSpPr>
+            <p:cNvPr id="13" name="꺾인 연결선 12"/>
+            <p:cNvCxnSpPr>
+              <a:stCxn id="7" idx="3"/>
+              <a:endCxn id="4" idx="2"/>
+            </p:cNvCxnSpPr>
+            <p:nvPr/>
+          </p:nvCxnSpPr>
+          <p:spPr>
+            <a:xfrm flipV="1">
+              <a:off x="7132319" y="3760967"/>
+              <a:ext cx="2441053" cy="1423283"/>
+            </a:xfrm>
+            <a:prstGeom prst="bentConnector2">
+              <a:avLst/>
+            </a:prstGeom>
+            <a:ln w="12700">
+              <a:tailEnd type="triangle"/>
+            </a:ln>
+          </p:spPr>
+          <p:style>
+            <a:lnRef idx="1">
+              <a:schemeClr val="dk1"/>
+            </a:lnRef>
+            <a:fillRef idx="0">
+              <a:schemeClr val="dk1"/>
+            </a:fillRef>
+            <a:effectRef idx="0">
+              <a:schemeClr val="dk1"/>
+            </a:effectRef>
+            <a:fontRef idx="minor">
+              <a:schemeClr val="tx1"/>
+            </a:fontRef>
+          </p:style>
+        </p:cxnSp>
+        <p:cxnSp>
+          <p:nvCxnSpPr>
+            <p:cNvPr id="16" name="꺾인 연결선 15"/>
+            <p:cNvCxnSpPr>
+              <a:stCxn id="4" idx="0"/>
+              <a:endCxn id="8" idx="3"/>
+            </p:cNvCxnSpPr>
+            <p:nvPr/>
+          </p:nvCxnSpPr>
+          <p:spPr>
+            <a:xfrm rot="16200000" flipV="1">
+              <a:off x="7716742" y="910423"/>
+              <a:ext cx="1272209" cy="2441053"/>
+            </a:xfrm>
+            <a:prstGeom prst="bentConnector2">
+              <a:avLst/>
+            </a:prstGeom>
+            <a:ln w="12700">
+              <a:tailEnd type="triangle"/>
+            </a:ln>
+          </p:spPr>
+          <p:style>
+            <a:lnRef idx="1">
+              <a:schemeClr val="dk1"/>
+            </a:lnRef>
+            <a:fillRef idx="0">
+              <a:schemeClr val="dk1"/>
+            </a:fillRef>
+            <a:effectRef idx="0">
+              <a:schemeClr val="dk1"/>
+            </a:effectRef>
+            <a:fontRef idx="minor">
+              <a:schemeClr val="tx1"/>
+            </a:fontRef>
+          </p:style>
+        </p:cxnSp>
+        <p:cxnSp>
+          <p:nvCxnSpPr>
+            <p:cNvPr id="21" name="꺾인 연결선 20"/>
+            <p:cNvCxnSpPr>
+              <a:stCxn id="8" idx="1"/>
+              <a:endCxn id="5" idx="0"/>
+            </p:cNvCxnSpPr>
+            <p:nvPr/>
+          </p:nvCxnSpPr>
+          <p:spPr>
+            <a:xfrm rot="10800000" flipV="1">
+              <a:off x="2194562" y="1494844"/>
+              <a:ext cx="2639830" cy="1272209"/>
+            </a:xfrm>
+            <a:prstGeom prst="bentConnector2">
+              <a:avLst/>
+            </a:prstGeom>
+            <a:ln w="12700">
+              <a:tailEnd type="triangle"/>
+            </a:ln>
+          </p:spPr>
+          <p:style>
+            <a:lnRef idx="1">
+              <a:schemeClr val="dk1"/>
+            </a:lnRef>
+            <a:fillRef idx="0">
+              <a:schemeClr val="dk1"/>
+            </a:fillRef>
+            <a:effectRef idx="0">
+              <a:schemeClr val="dk1"/>
+            </a:effectRef>
+            <a:fontRef idx="minor">
+              <a:schemeClr val="tx1"/>
+            </a:fontRef>
+          </p:style>
+        </p:cxnSp>
+      </p:grpSp>
+    </p:spTree>
+    <p:extLst>
+      <p:ext uri="{BB962C8B-B14F-4D97-AF65-F5344CB8AC3E}">
+        <p14:creationId xmlns:p14="http://schemas.microsoft.com/office/powerpoint/2010/main" val="4015044345"/>
+      </p:ext>
+    </p:extLst>
+  </p:cSld>
+  <p:clrMapOvr>
+    <a:masterClrMapping/>
+  </p:clrMapOvr>
+</p:sld>
+</file>
+
+<file path=ppt/slides/slide4.xml><?xml version="1.0" encoding="utf-8"?>
+<p:sld xmlns:a="http://schemas.openxmlformats.org/drawingml/2006/main" xmlns:r="http://schemas.openxmlformats.org/officeDocument/2006/relationships" xmlns:p="http://schemas.openxmlformats.org/presentationml/2006/main">
+  <p:cSld>
+    <p:spTree>
+      <p:nvGrpSpPr>
+        <p:cNvPr id="1" name=""/>
+        <p:cNvGrpSpPr/>
+        <p:nvPr/>
+      </p:nvGrpSpPr>
+      <p:grpSpPr>
+        <a:xfrm>
+          <a:off x="0" y="0"/>
+          <a:ext cx="0" cy="0"/>
+          <a:chOff x="0" y="0"/>
+          <a:chExt cx="0" cy="0"/>
+        </a:xfrm>
+      </p:grpSpPr>
+      <p:grpSp>
+        <p:nvGrpSpPr>
+          <p:cNvPr id="29" name="그룹 28"/>
+          <p:cNvGrpSpPr/>
+          <p:nvPr/>
+        </p:nvGrpSpPr>
+        <p:grpSpPr>
+          <a:xfrm>
+            <a:off x="1812899" y="677187"/>
+            <a:ext cx="6751982" cy="5356527"/>
+            <a:chOff x="1812899" y="677187"/>
+            <a:chExt cx="6751982" cy="5356527"/>
+          </a:xfrm>
+        </p:grpSpPr>
+        <p:sp>
+          <p:nvSpPr>
+            <p:cNvPr id="4" name="직사각형 3"/>
+            <p:cNvSpPr/>
+            <p:nvPr/>
+          </p:nvSpPr>
+          <p:spPr>
+            <a:xfrm>
+              <a:off x="1812899" y="2695493"/>
+              <a:ext cx="2576222" cy="993913"/>
+            </a:xfrm>
+            <a:prstGeom prst="rect">
+              <a:avLst/>
+            </a:prstGeom>
+            <a:noFill/>
+            <a:ln>
+              <a:solidFill>
+                <a:schemeClr val="tx1"/>
+              </a:solidFill>
+            </a:ln>
+          </p:spPr>
+          <p:style>
+            <a:lnRef idx="2">
+              <a:schemeClr val="accent1">
+                <a:shade val="50000"/>
+              </a:schemeClr>
+            </a:lnRef>
+            <a:fillRef idx="1">
+              <a:schemeClr val="accent1"/>
+            </a:fillRef>
+            <a:effectRef idx="0">
+              <a:schemeClr val="accent1"/>
+            </a:effectRef>
+            <a:fontRef idx="minor">
+              <a:schemeClr val="lt1"/>
+            </a:fontRef>
+          </p:style>
+          <p:txBody>
+            <a:bodyPr rtlCol="0" anchor="ctr"/>
+            <a:lstStyle/>
+            <a:p>
+              <a:pPr algn="ctr"/>
+              <a:r>
+                <a:rPr lang="en-US" altLang="ko-KR" dirty="0" smtClean="0">
+                  <a:solidFill>
+                    <a:schemeClr val="tx1"/>
+                  </a:solidFill>
+                </a:rPr>
+                <a:t>LDPC decoder</a:t>
+              </a:r>
+              <a:endParaRPr lang="ko-KR" altLang="en-US" dirty="0">
+                <a:solidFill>
+                  <a:schemeClr val="tx1"/>
+                </a:solidFill>
+              </a:endParaRPr>
+            </a:p>
+          </p:txBody>
+        </p:sp>
+        <p:sp>
+          <p:nvSpPr>
+            <p:cNvPr id="11" name="직사각형 10"/>
+            <p:cNvSpPr/>
+            <p:nvPr/>
+          </p:nvSpPr>
+          <p:spPr>
+            <a:xfrm>
+              <a:off x="5988659" y="677187"/>
+              <a:ext cx="2576222" cy="993913"/>
+            </a:xfrm>
+            <a:prstGeom prst="rect">
+              <a:avLst/>
+            </a:prstGeom>
+            <a:noFill/>
+            <a:ln>
+              <a:solidFill>
+                <a:schemeClr val="tx1"/>
+              </a:solidFill>
+            </a:ln>
+          </p:spPr>
+          <p:style>
+            <a:lnRef idx="2">
+              <a:schemeClr val="accent1">
+                <a:shade val="50000"/>
+              </a:schemeClr>
+            </a:lnRef>
+            <a:fillRef idx="1">
+              <a:schemeClr val="accent1"/>
+            </a:fillRef>
+            <a:effectRef idx="0">
+              <a:schemeClr val="accent1"/>
+            </a:effectRef>
+            <a:fontRef idx="minor">
+              <a:schemeClr val="lt1"/>
+            </a:fontRef>
+          </p:style>
+          <p:txBody>
+            <a:bodyPr rtlCol="0" anchor="ctr"/>
+            <a:lstStyle/>
+            <a:p>
+              <a:pPr algn="ctr"/>
+              <a:r>
+                <a:rPr lang="en-US" altLang="ko-KR" dirty="0" smtClean="0">
+                  <a:solidFill>
+                    <a:schemeClr val="tx1"/>
+                  </a:solidFill>
+                </a:rPr>
+                <a:t>function1</a:t>
+              </a:r>
+              <a:endParaRPr lang="ko-KR" altLang="en-US" dirty="0">
+                <a:solidFill>
+                  <a:schemeClr val="tx1"/>
+                </a:solidFill>
+              </a:endParaRPr>
+            </a:p>
+          </p:txBody>
+        </p:sp>
+        <p:sp>
+          <p:nvSpPr>
+            <p:cNvPr id="12" name="직사각형 11"/>
+            <p:cNvSpPr/>
+            <p:nvPr/>
+          </p:nvSpPr>
+          <p:spPr>
+            <a:xfrm>
+              <a:off x="5988659" y="1808922"/>
+              <a:ext cx="2576222" cy="993913"/>
+            </a:xfrm>
+            <a:prstGeom prst="rect">
+              <a:avLst/>
+            </a:prstGeom>
+            <a:noFill/>
+            <a:ln>
+              <a:solidFill>
+                <a:schemeClr val="tx1"/>
+              </a:solidFill>
+            </a:ln>
+          </p:spPr>
+          <p:style>
+            <a:lnRef idx="2">
+              <a:schemeClr val="accent1">
+                <a:shade val="50000"/>
+              </a:schemeClr>
+            </a:lnRef>
+            <a:fillRef idx="1">
+              <a:schemeClr val="accent1"/>
+            </a:fillRef>
+            <a:effectRef idx="0">
+              <a:schemeClr val="accent1"/>
+            </a:effectRef>
+            <a:fontRef idx="minor">
+              <a:schemeClr val="lt1"/>
+            </a:fontRef>
+          </p:style>
+          <p:txBody>
+            <a:bodyPr rtlCol="0" anchor="ctr"/>
+            <a:lstStyle/>
+            <a:p>
+              <a:pPr algn="ctr"/>
+              <a:r>
+                <a:rPr lang="en-US" altLang="ko-KR" dirty="0" smtClean="0">
+                  <a:solidFill>
+                    <a:schemeClr val="tx1"/>
+                  </a:solidFill>
+                </a:rPr>
+                <a:t>function2</a:t>
+              </a:r>
+              <a:endParaRPr lang="ko-KR" altLang="en-US" dirty="0">
+                <a:solidFill>
+                  <a:schemeClr val="tx1"/>
+                </a:solidFill>
+              </a:endParaRPr>
+            </a:p>
+          </p:txBody>
+        </p:sp>
+        <p:sp>
+          <p:nvSpPr>
+            <p:cNvPr id="15" name="직사각형 14"/>
+            <p:cNvSpPr/>
+            <p:nvPr/>
+          </p:nvSpPr>
+          <p:spPr>
+            <a:xfrm>
+              <a:off x="5988659" y="5039801"/>
+              <a:ext cx="2576222" cy="993913"/>
+            </a:xfrm>
+            <a:prstGeom prst="rect">
+              <a:avLst/>
+            </a:prstGeom>
+            <a:noFill/>
+            <a:ln>
+              <a:solidFill>
+                <a:schemeClr val="tx1"/>
+              </a:solidFill>
+            </a:ln>
+          </p:spPr>
+          <p:style>
+            <a:lnRef idx="2">
+              <a:schemeClr val="accent1">
+                <a:shade val="50000"/>
+              </a:schemeClr>
+            </a:lnRef>
+            <a:fillRef idx="1">
+              <a:schemeClr val="accent1"/>
+            </a:fillRef>
+            <a:effectRef idx="0">
+              <a:schemeClr val="accent1"/>
+            </a:effectRef>
+            <a:fontRef idx="minor">
+              <a:schemeClr val="lt1"/>
+            </a:fontRef>
+          </p:style>
+          <p:txBody>
+            <a:bodyPr rtlCol="0" anchor="ctr"/>
+            <a:lstStyle/>
+            <a:p>
+              <a:pPr algn="ctr"/>
+              <a:r>
+                <a:rPr lang="en-US" altLang="ko-KR" dirty="0" smtClean="0">
+                  <a:solidFill>
+                    <a:schemeClr val="tx1"/>
+                  </a:solidFill>
+                </a:rPr>
+                <a:t>Function n</a:t>
+              </a:r>
+              <a:endParaRPr lang="ko-KR" altLang="en-US" dirty="0">
+                <a:solidFill>
+                  <a:schemeClr val="tx1"/>
+                </a:solidFill>
+              </a:endParaRPr>
+            </a:p>
+          </p:txBody>
+        </p:sp>
+        <p:sp>
+          <p:nvSpPr>
+            <p:cNvPr id="17" name="직사각형 16"/>
+            <p:cNvSpPr/>
+            <p:nvPr/>
+          </p:nvSpPr>
+          <p:spPr>
+            <a:xfrm>
+              <a:off x="5988659" y="2961861"/>
+              <a:ext cx="2576222" cy="993913"/>
+            </a:xfrm>
+            <a:prstGeom prst="rect">
+              <a:avLst/>
+            </a:prstGeom>
+            <a:noFill/>
+            <a:ln>
+              <a:solidFill>
+                <a:schemeClr val="tx1"/>
+              </a:solidFill>
+            </a:ln>
+          </p:spPr>
+          <p:style>
+            <a:lnRef idx="2">
+              <a:schemeClr val="accent1">
+                <a:shade val="50000"/>
+              </a:schemeClr>
+            </a:lnRef>
+            <a:fillRef idx="1">
+              <a:schemeClr val="accent1"/>
+            </a:fillRef>
+            <a:effectRef idx="0">
+              <a:schemeClr val="accent1"/>
+            </a:effectRef>
+            <a:fontRef idx="minor">
+              <a:schemeClr val="lt1"/>
+            </a:fontRef>
+          </p:style>
+          <p:txBody>
+            <a:bodyPr rtlCol="0" anchor="ctr"/>
+            <a:lstStyle/>
+            <a:p>
+              <a:pPr algn="ctr"/>
+              <a:r>
+                <a:rPr lang="en-US" altLang="ko-KR" dirty="0" smtClean="0">
+                  <a:solidFill>
+                    <a:schemeClr val="tx1"/>
+                  </a:solidFill>
+                </a:rPr>
+                <a:t>function3</a:t>
+              </a:r>
+              <a:endParaRPr lang="ko-KR" altLang="en-US" dirty="0">
+                <a:solidFill>
+                  <a:schemeClr val="tx1"/>
+                </a:solidFill>
+              </a:endParaRPr>
+            </a:p>
+          </p:txBody>
+        </p:sp>
+        <p:sp>
+          <p:nvSpPr>
+            <p:cNvPr id="18" name="직사각형 17"/>
+            <p:cNvSpPr/>
+            <p:nvPr/>
+          </p:nvSpPr>
+          <p:spPr>
+            <a:xfrm>
+              <a:off x="5988659" y="3955774"/>
+              <a:ext cx="2576222" cy="993913"/>
+            </a:xfrm>
+            <a:prstGeom prst="rect">
+              <a:avLst/>
+            </a:prstGeom>
+            <a:noFill/>
+            <a:ln>
+              <a:noFill/>
+            </a:ln>
+          </p:spPr>
+          <p:style>
+            <a:lnRef idx="2">
+              <a:schemeClr val="accent1">
+                <a:shade val="50000"/>
+              </a:schemeClr>
+            </a:lnRef>
+            <a:fillRef idx="1">
+              <a:schemeClr val="accent1"/>
+            </a:fillRef>
+            <a:effectRef idx="0">
+              <a:schemeClr val="accent1"/>
+            </a:effectRef>
+            <a:fontRef idx="minor">
+              <a:schemeClr val="lt1"/>
+            </a:fontRef>
+          </p:style>
+          <p:txBody>
+            <a:bodyPr rtlCol="0" anchor="ctr"/>
+            <a:lstStyle/>
+            <a:p>
+              <a:pPr algn="ctr"/>
+              <a:r>
+                <a:rPr lang="en-US" altLang="ko-KR" dirty="0" smtClean="0">
+                  <a:solidFill>
+                    <a:schemeClr val="tx1"/>
+                  </a:solidFill>
+                </a:rPr>
+                <a:t>.</a:t>
+              </a:r>
+            </a:p>
+            <a:p>
+              <a:pPr algn="ctr"/>
+              <a:r>
+                <a:rPr lang="en-US" altLang="ko-KR" dirty="0" smtClean="0">
+                  <a:solidFill>
+                    <a:schemeClr val="tx1"/>
+                  </a:solidFill>
+                </a:rPr>
+                <a:t>.</a:t>
+              </a:r>
+            </a:p>
+            <a:p>
+              <a:pPr algn="ctr"/>
+              <a:r>
+                <a:rPr lang="en-US" altLang="ko-KR" dirty="0">
+                  <a:solidFill>
+                    <a:schemeClr val="tx1"/>
+                  </a:solidFill>
+                </a:rPr>
+                <a:t>.</a:t>
+              </a:r>
+              <a:endParaRPr lang="en-US" altLang="ko-KR" dirty="0" smtClean="0">
+                <a:solidFill>
+                  <a:schemeClr val="tx1"/>
+                </a:solidFill>
+              </a:endParaRPr>
+            </a:p>
+          </p:txBody>
+        </p:sp>
+        <p:cxnSp>
+          <p:nvCxnSpPr>
+            <p:cNvPr id="3" name="꺾인 연결선 2"/>
+            <p:cNvCxnSpPr>
+              <a:stCxn id="11" idx="1"/>
+              <a:endCxn id="4" idx="3"/>
+            </p:cNvCxnSpPr>
+            <p:nvPr/>
+          </p:nvCxnSpPr>
+          <p:spPr>
+            <a:xfrm rot="10800000" flipV="1">
+              <a:off x="4389121" y="1174144"/>
+              <a:ext cx="1599538" cy="2018306"/>
+            </a:xfrm>
+            <a:prstGeom prst="bentConnector3">
+              <a:avLst/>
+            </a:prstGeom>
+            <a:ln w="12700">
+              <a:solidFill>
+                <a:schemeClr val="tx1"/>
+              </a:solidFill>
+              <a:tailEnd type="triangle"/>
+            </a:ln>
+          </p:spPr>
+          <p:style>
+            <a:lnRef idx="1">
+              <a:schemeClr val="accent1"/>
+            </a:lnRef>
+            <a:fillRef idx="0">
+              <a:schemeClr val="accent1"/>
+            </a:fillRef>
+            <a:effectRef idx="0">
+              <a:schemeClr val="accent1"/>
+            </a:effectRef>
+            <a:fontRef idx="minor">
+              <a:schemeClr val="tx1"/>
+            </a:fontRef>
+          </p:style>
+        </p:cxnSp>
+        <p:cxnSp>
+          <p:nvCxnSpPr>
+            <p:cNvPr id="19" name="꺾인 연결선 18"/>
+            <p:cNvCxnSpPr>
+              <a:stCxn id="12" idx="1"/>
+              <a:endCxn id="4" idx="3"/>
+            </p:cNvCxnSpPr>
+            <p:nvPr/>
+          </p:nvCxnSpPr>
+          <p:spPr>
+            <a:xfrm rot="10800000" flipV="1">
+              <a:off x="4389121" y="2305878"/>
+              <a:ext cx="1599538" cy="886571"/>
+            </a:xfrm>
+            <a:prstGeom prst="bentConnector3">
+              <a:avLst/>
+            </a:prstGeom>
+            <a:ln w="12700">
+              <a:solidFill>
+                <a:schemeClr val="tx1"/>
+              </a:solidFill>
+              <a:tailEnd type="triangle"/>
+            </a:ln>
+          </p:spPr>
+          <p:style>
+            <a:lnRef idx="1">
+              <a:schemeClr val="accent1"/>
+            </a:lnRef>
+            <a:fillRef idx="0">
+              <a:schemeClr val="accent1"/>
+            </a:fillRef>
+            <a:effectRef idx="0">
+              <a:schemeClr val="accent1"/>
+            </a:effectRef>
+            <a:fontRef idx="minor">
+              <a:schemeClr val="tx1"/>
+            </a:fontRef>
+          </p:style>
+        </p:cxnSp>
+        <p:cxnSp>
+          <p:nvCxnSpPr>
+            <p:cNvPr id="23" name="꺾인 연결선 22"/>
+            <p:cNvCxnSpPr>
+              <a:stCxn id="17" idx="1"/>
+              <a:endCxn id="4" idx="3"/>
+            </p:cNvCxnSpPr>
+            <p:nvPr/>
+          </p:nvCxnSpPr>
+          <p:spPr>
+            <a:xfrm rot="10800000">
+              <a:off x="4389121" y="3192450"/>
+              <a:ext cx="1599538" cy="266368"/>
+            </a:xfrm>
+            <a:prstGeom prst="bentConnector3">
+              <a:avLst/>
+            </a:prstGeom>
+            <a:ln w="12700">
+              <a:solidFill>
+                <a:schemeClr val="tx1"/>
+              </a:solidFill>
+              <a:tailEnd type="triangle"/>
+            </a:ln>
+          </p:spPr>
+          <p:style>
+            <a:lnRef idx="1">
+              <a:schemeClr val="accent1"/>
+            </a:lnRef>
+            <a:fillRef idx="0">
+              <a:schemeClr val="accent1"/>
+            </a:fillRef>
+            <a:effectRef idx="0">
+              <a:schemeClr val="accent1"/>
+            </a:effectRef>
+            <a:fontRef idx="minor">
+              <a:schemeClr val="tx1"/>
+            </a:fontRef>
+          </p:style>
+        </p:cxnSp>
+        <p:cxnSp>
+          <p:nvCxnSpPr>
+            <p:cNvPr id="27" name="꺾인 연결선 26"/>
+            <p:cNvCxnSpPr>
+              <a:stCxn id="15" idx="1"/>
+              <a:endCxn id="4" idx="3"/>
+            </p:cNvCxnSpPr>
+            <p:nvPr/>
+          </p:nvCxnSpPr>
+          <p:spPr>
+            <a:xfrm rot="10800000">
+              <a:off x="4389121" y="3192450"/>
+              <a:ext cx="1599538" cy="2344308"/>
+            </a:xfrm>
+            <a:prstGeom prst="bentConnector3">
+              <a:avLst/>
+            </a:prstGeom>
+            <a:ln w="12700">
+              <a:solidFill>
+                <a:schemeClr val="tx1"/>
+              </a:solidFill>
+              <a:tailEnd type="triangle"/>
+            </a:ln>
+          </p:spPr>
+          <p:style>
+            <a:lnRef idx="1">
+              <a:schemeClr val="accent1"/>
+            </a:lnRef>
+            <a:fillRef idx="0">
+              <a:schemeClr val="accent1"/>
+            </a:fillRef>
+            <a:effectRef idx="0">
+              <a:schemeClr val="accent1"/>
+            </a:effectRef>
+            <a:fontRef idx="minor">
+              <a:schemeClr val="tx1"/>
+            </a:fontRef>
+          </p:style>
+        </p:cxnSp>
+      </p:grpSp>
+    </p:spTree>
+    <p:extLst>
+      <p:ext uri="{BB962C8B-B14F-4D97-AF65-F5344CB8AC3E}">
+        <p14:creationId xmlns:p14="http://schemas.microsoft.com/office/powerpoint/2010/main" val="2494300248"/>
+      </p:ext>
+    </p:extLst>
+  </p:cSld>
+  <p:clrMapOvr>
+    <a:masterClrMapping/>
+  </p:clrMapOvr>
+</p:sld>
+</file>
+
+<file path=ppt/slides/slide5.xml><?xml version="1.0" encoding="utf-8"?>
+<p:sld xmlns:a="http://schemas.openxmlformats.org/drawingml/2006/main" xmlns:r="http://schemas.openxmlformats.org/officeDocument/2006/relationships" xmlns:p="http://schemas.openxmlformats.org/presentationml/2006/main">
+  <p:cSld>
+    <p:spTree>
+      <p:nvGrpSpPr>
+        <p:cNvPr id="1" name=""/>
+        <p:cNvGrpSpPr/>
+        <p:nvPr/>
+      </p:nvGrpSpPr>
+      <p:grpSpPr>
+        <a:xfrm>
+          <a:off x="0" y="0"/>
+          <a:ext cx="0" cy="0"/>
+          <a:chOff x="0" y="0"/>
+          <a:chExt cx="0" cy="0"/>
+        </a:xfrm>
+      </p:grpSpPr>
+      <p:grpSp>
+        <p:nvGrpSpPr>
+          <p:cNvPr id="47" name="그룹 46"/>
+          <p:cNvGrpSpPr/>
+          <p:nvPr/>
+        </p:nvGrpSpPr>
+        <p:grpSpPr>
+          <a:xfrm>
+            <a:off x="265428" y="909913"/>
+            <a:ext cx="11065591" cy="4423576"/>
+            <a:chOff x="265428" y="909913"/>
+            <a:chExt cx="11065591" cy="4423576"/>
+          </a:xfrm>
+        </p:grpSpPr>
+        <p:sp>
+          <p:nvSpPr>
+            <p:cNvPr id="11" name="직사각형 10"/>
+            <p:cNvSpPr/>
+            <p:nvPr/>
+          </p:nvSpPr>
+          <p:spPr>
+            <a:xfrm>
+              <a:off x="9533138" y="1631777"/>
+              <a:ext cx="1797881" cy="397922"/>
+            </a:xfrm>
+            <a:prstGeom prst="rect">
+              <a:avLst/>
+            </a:prstGeom>
+            <a:noFill/>
+            <a:ln>
+              <a:solidFill>
+                <a:schemeClr val="tx1"/>
+              </a:solidFill>
+            </a:ln>
+          </p:spPr>
+          <p:style>
+            <a:lnRef idx="2">
+              <a:schemeClr val="accent1">
+                <a:shade val="50000"/>
+              </a:schemeClr>
+            </a:lnRef>
+            <a:fillRef idx="1">
+              <a:schemeClr val="accent1"/>
+            </a:fillRef>
+            <a:effectRef idx="0">
+              <a:schemeClr val="accent1"/>
+            </a:effectRef>
+            <a:fontRef idx="minor">
+              <a:schemeClr val="lt1"/>
+            </a:fontRef>
+          </p:style>
+          <p:txBody>
+            <a:bodyPr rtlCol="0" anchor="ctr"/>
+            <a:lstStyle/>
+            <a:p>
+              <a:pPr algn="ctr"/>
+              <a:r>
+                <a:rPr lang="en-US" altLang="ko-KR" dirty="0" smtClean="0">
+                  <a:solidFill>
+                    <a:schemeClr val="tx1"/>
+                  </a:solidFill>
+                </a:rPr>
+                <a:t>function1</a:t>
+              </a:r>
+              <a:endParaRPr lang="ko-KR" altLang="en-US" dirty="0">
+                <a:solidFill>
+                  <a:schemeClr val="tx1"/>
+                </a:solidFill>
+              </a:endParaRPr>
+            </a:p>
+          </p:txBody>
+        </p:sp>
+        <p:sp>
+          <p:nvSpPr>
+            <p:cNvPr id="12" name="직사각형 11"/>
+            <p:cNvSpPr/>
+            <p:nvPr/>
+          </p:nvSpPr>
+          <p:spPr>
+            <a:xfrm>
+              <a:off x="9533138" y="2473059"/>
+              <a:ext cx="1797881" cy="397922"/>
+            </a:xfrm>
+            <a:prstGeom prst="rect">
+              <a:avLst/>
+            </a:prstGeom>
+            <a:noFill/>
+            <a:ln>
+              <a:solidFill>
+                <a:schemeClr val="tx1"/>
+              </a:solidFill>
+            </a:ln>
+          </p:spPr>
+          <p:style>
+            <a:lnRef idx="2">
+              <a:schemeClr val="accent1">
+                <a:shade val="50000"/>
+              </a:schemeClr>
+            </a:lnRef>
+            <a:fillRef idx="1">
+              <a:schemeClr val="accent1"/>
+            </a:fillRef>
+            <a:effectRef idx="0">
+              <a:schemeClr val="accent1"/>
+            </a:effectRef>
+            <a:fontRef idx="minor">
+              <a:schemeClr val="lt1"/>
+            </a:fontRef>
+          </p:style>
+          <p:txBody>
+            <a:bodyPr rtlCol="0" anchor="ctr"/>
+            <a:lstStyle/>
+            <a:p>
+              <a:pPr algn="ctr"/>
+              <a:r>
+                <a:rPr lang="en-US" altLang="ko-KR" dirty="0" smtClean="0">
+                  <a:solidFill>
+                    <a:schemeClr val="tx1"/>
+                  </a:solidFill>
+                </a:rPr>
+                <a:t>function2</a:t>
+              </a:r>
+              <a:endParaRPr lang="ko-KR" altLang="en-US" dirty="0">
+                <a:solidFill>
+                  <a:schemeClr val="tx1"/>
+                </a:solidFill>
+              </a:endParaRPr>
+            </a:p>
+          </p:txBody>
+        </p:sp>
+        <p:sp>
+          <p:nvSpPr>
+            <p:cNvPr id="15" name="직사각형 14"/>
+            <p:cNvSpPr/>
+            <p:nvPr/>
+          </p:nvSpPr>
+          <p:spPr>
+            <a:xfrm>
+              <a:off x="9533138" y="4305162"/>
+              <a:ext cx="1797881" cy="397922"/>
+            </a:xfrm>
+            <a:prstGeom prst="rect">
+              <a:avLst/>
+            </a:prstGeom>
+            <a:noFill/>
+            <a:ln>
+              <a:solidFill>
+                <a:schemeClr val="tx1"/>
+              </a:solidFill>
+            </a:ln>
+          </p:spPr>
+          <p:style>
+            <a:lnRef idx="2">
+              <a:schemeClr val="accent1">
+                <a:shade val="50000"/>
+              </a:schemeClr>
+            </a:lnRef>
+            <a:fillRef idx="1">
+              <a:schemeClr val="accent1"/>
+            </a:fillRef>
+            <a:effectRef idx="0">
+              <a:schemeClr val="accent1"/>
+            </a:effectRef>
+            <a:fontRef idx="minor">
+              <a:schemeClr val="lt1"/>
+            </a:fontRef>
+          </p:style>
+          <p:txBody>
+            <a:bodyPr rtlCol="0" anchor="ctr"/>
+            <a:lstStyle/>
+            <a:p>
+              <a:pPr algn="ctr"/>
+              <a:r>
+                <a:rPr lang="en-US" altLang="ko-KR" dirty="0" smtClean="0">
+                  <a:solidFill>
+                    <a:schemeClr val="tx1"/>
+                  </a:solidFill>
+                </a:rPr>
+                <a:t>Function n</a:t>
+              </a:r>
+              <a:endParaRPr lang="ko-KR" altLang="en-US" dirty="0">
+                <a:solidFill>
+                  <a:schemeClr val="tx1"/>
+                </a:solidFill>
+              </a:endParaRPr>
+            </a:p>
+          </p:txBody>
+        </p:sp>
+        <p:sp>
+          <p:nvSpPr>
+            <p:cNvPr id="17" name="직사각형 16"/>
+            <p:cNvSpPr/>
+            <p:nvPr/>
+          </p:nvSpPr>
+          <p:spPr>
+            <a:xfrm>
+              <a:off x="9533138" y="3036425"/>
+              <a:ext cx="1797881" cy="397922"/>
+            </a:xfrm>
+            <a:prstGeom prst="rect">
+              <a:avLst/>
+            </a:prstGeom>
+            <a:noFill/>
+            <a:ln>
+              <a:solidFill>
+                <a:schemeClr val="tx1"/>
+              </a:solidFill>
+            </a:ln>
+          </p:spPr>
+          <p:style>
+            <a:lnRef idx="2">
+              <a:schemeClr val="accent1">
+                <a:shade val="50000"/>
+              </a:schemeClr>
+            </a:lnRef>
+            <a:fillRef idx="1">
+              <a:schemeClr val="accent1"/>
+            </a:fillRef>
+            <a:effectRef idx="0">
+              <a:schemeClr val="accent1"/>
+            </a:effectRef>
+            <a:fontRef idx="minor">
+              <a:schemeClr val="lt1"/>
+            </a:fontRef>
+          </p:style>
+          <p:txBody>
+            <a:bodyPr rtlCol="0" anchor="ctr"/>
+            <a:lstStyle/>
+            <a:p>
+              <a:pPr algn="ctr"/>
+              <a:r>
+                <a:rPr lang="en-US" altLang="ko-KR" dirty="0" smtClean="0">
+                  <a:solidFill>
+                    <a:schemeClr val="tx1"/>
+                  </a:solidFill>
+                </a:rPr>
+                <a:t>function3</a:t>
+              </a:r>
+              <a:endParaRPr lang="ko-KR" altLang="en-US" dirty="0">
+                <a:solidFill>
+                  <a:schemeClr val="tx1"/>
+                </a:solidFill>
+              </a:endParaRPr>
+            </a:p>
+          </p:txBody>
+        </p:sp>
+        <p:sp>
+          <p:nvSpPr>
+            <p:cNvPr id="18" name="직사각형 17"/>
+            <p:cNvSpPr/>
+            <p:nvPr/>
+          </p:nvSpPr>
+          <p:spPr>
+            <a:xfrm>
+              <a:off x="9533138" y="3784517"/>
+              <a:ext cx="1797881" cy="133524"/>
+            </a:xfrm>
+            <a:prstGeom prst="rect">
+              <a:avLst/>
+            </a:prstGeom>
+            <a:noFill/>
+            <a:ln>
+              <a:noFill/>
+            </a:ln>
+          </p:spPr>
+          <p:style>
+            <a:lnRef idx="2">
+              <a:schemeClr val="accent1">
+                <a:shade val="50000"/>
+              </a:schemeClr>
+            </a:lnRef>
+            <a:fillRef idx="1">
+              <a:schemeClr val="accent1"/>
+            </a:fillRef>
+            <a:effectRef idx="0">
+              <a:schemeClr val="accent1"/>
+            </a:effectRef>
+            <a:fontRef idx="minor">
+              <a:schemeClr val="lt1"/>
+            </a:fontRef>
+          </p:style>
+          <p:txBody>
+            <a:bodyPr rtlCol="0" anchor="ctr"/>
+            <a:lstStyle/>
+            <a:p>
+              <a:pPr algn="ctr"/>
+              <a:r>
+                <a:rPr lang="en-US" altLang="ko-KR" dirty="0" smtClean="0">
+                  <a:solidFill>
+                    <a:schemeClr val="tx1"/>
+                  </a:solidFill>
+                </a:rPr>
+                <a:t>.</a:t>
+              </a:r>
+            </a:p>
+            <a:p>
+              <a:pPr algn="ctr"/>
+              <a:r>
+                <a:rPr lang="en-US" altLang="ko-KR" dirty="0" smtClean="0">
+                  <a:solidFill>
+                    <a:schemeClr val="tx1"/>
+                  </a:solidFill>
+                </a:rPr>
+                <a:t>.</a:t>
+              </a:r>
+            </a:p>
+            <a:p>
+              <a:pPr algn="ctr"/>
+              <a:r>
+                <a:rPr lang="en-US" altLang="ko-KR" dirty="0">
+                  <a:solidFill>
+                    <a:schemeClr val="tx1"/>
+                  </a:solidFill>
+                </a:rPr>
+                <a:t>.</a:t>
+              </a:r>
+              <a:endParaRPr lang="en-US" altLang="ko-KR" dirty="0" smtClean="0">
+                <a:solidFill>
+                  <a:schemeClr val="tx1"/>
+                </a:solidFill>
+              </a:endParaRPr>
+            </a:p>
+          </p:txBody>
+        </p:sp>
+        <p:cxnSp>
+          <p:nvCxnSpPr>
+            <p:cNvPr id="3" name="꺾인 연결선 2"/>
+            <p:cNvCxnSpPr>
+              <a:stCxn id="11" idx="1"/>
+              <a:endCxn id="21" idx="3"/>
+            </p:cNvCxnSpPr>
+            <p:nvPr/>
+          </p:nvCxnSpPr>
+          <p:spPr>
+            <a:xfrm rot="10800000" flipV="1">
+              <a:off x="7009466" y="1830737"/>
+              <a:ext cx="2523673" cy="1216489"/>
+            </a:xfrm>
+            <a:prstGeom prst="bentConnector3">
+              <a:avLst>
+                <a:gd name="adj1" fmla="val 50000"/>
+              </a:avLst>
+            </a:prstGeom>
+            <a:ln w="12700">
+              <a:solidFill>
+                <a:schemeClr val="tx1"/>
+              </a:solidFill>
+              <a:tailEnd type="triangle"/>
+            </a:ln>
+          </p:spPr>
+          <p:style>
+            <a:lnRef idx="1">
+              <a:schemeClr val="accent1"/>
+            </a:lnRef>
+            <a:fillRef idx="0">
+              <a:schemeClr val="accent1"/>
+            </a:fillRef>
+            <a:effectRef idx="0">
+              <a:schemeClr val="accent1"/>
+            </a:effectRef>
+            <a:fontRef idx="minor">
+              <a:schemeClr val="tx1"/>
+            </a:fontRef>
+          </p:style>
+        </p:cxnSp>
+        <p:cxnSp>
+          <p:nvCxnSpPr>
+            <p:cNvPr id="19" name="꺾인 연결선 18"/>
+            <p:cNvCxnSpPr>
+              <a:stCxn id="12" idx="1"/>
+              <a:endCxn id="21" idx="3"/>
+            </p:cNvCxnSpPr>
+            <p:nvPr/>
+          </p:nvCxnSpPr>
+          <p:spPr>
+            <a:xfrm rot="10800000" flipV="1">
+              <a:off x="7009466" y="2672019"/>
+              <a:ext cx="2523673" cy="375207"/>
+            </a:xfrm>
+            <a:prstGeom prst="bentConnector3">
+              <a:avLst/>
+            </a:prstGeom>
+            <a:ln w="12700">
+              <a:solidFill>
+                <a:schemeClr val="tx1"/>
+              </a:solidFill>
+              <a:tailEnd type="triangle"/>
+            </a:ln>
+          </p:spPr>
+          <p:style>
+            <a:lnRef idx="1">
+              <a:schemeClr val="accent1"/>
+            </a:lnRef>
+            <a:fillRef idx="0">
+              <a:schemeClr val="accent1"/>
+            </a:fillRef>
+            <a:effectRef idx="0">
+              <a:schemeClr val="accent1"/>
+            </a:effectRef>
+            <a:fontRef idx="minor">
+              <a:schemeClr val="tx1"/>
+            </a:fontRef>
+          </p:style>
+        </p:cxnSp>
+        <p:cxnSp>
+          <p:nvCxnSpPr>
+            <p:cNvPr id="23" name="꺾인 연결선 22"/>
+            <p:cNvCxnSpPr>
+              <a:stCxn id="17" idx="1"/>
+              <a:endCxn id="21" idx="3"/>
+            </p:cNvCxnSpPr>
+            <p:nvPr/>
+          </p:nvCxnSpPr>
+          <p:spPr>
+            <a:xfrm rot="10800000">
+              <a:off x="7009466" y="3047228"/>
+              <a:ext cx="2523673" cy="188159"/>
+            </a:xfrm>
+            <a:prstGeom prst="bentConnector3">
+              <a:avLst/>
+            </a:prstGeom>
+            <a:ln w="12700">
+              <a:solidFill>
+                <a:schemeClr val="tx1"/>
+              </a:solidFill>
+              <a:tailEnd type="triangle"/>
+            </a:ln>
+          </p:spPr>
+          <p:style>
+            <a:lnRef idx="1">
+              <a:schemeClr val="accent1"/>
+            </a:lnRef>
+            <a:fillRef idx="0">
+              <a:schemeClr val="accent1"/>
+            </a:fillRef>
+            <a:effectRef idx="0">
+              <a:schemeClr val="accent1"/>
+            </a:effectRef>
+            <a:fontRef idx="minor">
+              <a:schemeClr val="tx1"/>
+            </a:fontRef>
+          </p:style>
+        </p:cxnSp>
+        <p:cxnSp>
+          <p:nvCxnSpPr>
+            <p:cNvPr id="27" name="꺾인 연결선 26"/>
+            <p:cNvCxnSpPr>
+              <a:stCxn id="15" idx="1"/>
+              <a:endCxn id="21" idx="3"/>
+            </p:cNvCxnSpPr>
+            <p:nvPr/>
+          </p:nvCxnSpPr>
+          <p:spPr>
+            <a:xfrm rot="10800000">
+              <a:off x="7009466" y="3047227"/>
+              <a:ext cx="2523673" cy="1456896"/>
+            </a:xfrm>
+            <a:prstGeom prst="bentConnector3">
+              <a:avLst>
+                <a:gd name="adj1" fmla="val 50000"/>
+              </a:avLst>
+            </a:prstGeom>
+            <a:ln w="12700">
+              <a:solidFill>
+                <a:schemeClr val="tx1"/>
+              </a:solidFill>
+              <a:tailEnd type="triangle"/>
+            </a:ln>
+          </p:spPr>
+          <p:style>
+            <a:lnRef idx="1">
+              <a:schemeClr val="accent1"/>
+            </a:lnRef>
+            <a:fillRef idx="0">
+              <a:schemeClr val="accent1"/>
+            </a:fillRef>
+            <a:effectRef idx="0">
+              <a:schemeClr val="accent1"/>
+            </a:effectRef>
+            <a:fontRef idx="minor">
+              <a:schemeClr val="tx1"/>
+            </a:fontRef>
+          </p:style>
+        </p:cxnSp>
+        <p:sp>
+          <p:nvSpPr>
+            <p:cNvPr id="21" name="직사각형 20"/>
+            <p:cNvSpPr/>
+            <p:nvPr/>
+          </p:nvSpPr>
+          <p:spPr>
+            <a:xfrm>
+              <a:off x="4889912" y="2683055"/>
+              <a:ext cx="2119553" cy="728344"/>
+            </a:xfrm>
+            <a:prstGeom prst="rect">
+              <a:avLst/>
+            </a:prstGeom>
+            <a:noFill/>
+            <a:ln>
+              <a:solidFill>
+                <a:schemeClr val="tx1"/>
+              </a:solidFill>
+            </a:ln>
+          </p:spPr>
+          <p:style>
+            <a:lnRef idx="2">
+              <a:schemeClr val="accent1">
+                <a:shade val="50000"/>
+              </a:schemeClr>
+            </a:lnRef>
+            <a:fillRef idx="1">
+              <a:schemeClr val="accent1"/>
+            </a:fillRef>
+            <a:effectRef idx="0">
+              <a:schemeClr val="accent1"/>
+            </a:effectRef>
+            <a:fontRef idx="minor">
+              <a:schemeClr val="lt1"/>
+            </a:fontRef>
+          </p:style>
+          <p:txBody>
+            <a:bodyPr rtlCol="0" anchor="ctr"/>
+            <a:lstStyle/>
+            <a:p>
+              <a:pPr algn="ctr"/>
+              <a:r>
+                <a:rPr lang="en-US" altLang="ko-KR" dirty="0" smtClean="0">
+                  <a:solidFill>
+                    <a:schemeClr val="tx1"/>
+                  </a:solidFill>
+                </a:rPr>
+                <a:t>LDPC decoder</a:t>
+              </a:r>
+              <a:endParaRPr lang="ko-KR" altLang="en-US" dirty="0">
+                <a:solidFill>
+                  <a:schemeClr val="tx1"/>
+                </a:solidFill>
+              </a:endParaRPr>
+            </a:p>
+          </p:txBody>
+        </p:sp>
+        <p:sp>
+          <p:nvSpPr>
+            <p:cNvPr id="22" name="직사각형 21"/>
+            <p:cNvSpPr/>
+            <p:nvPr/>
+          </p:nvSpPr>
+          <p:spPr>
+            <a:xfrm>
+              <a:off x="265428" y="2683055"/>
+              <a:ext cx="2119553" cy="728344"/>
+            </a:xfrm>
+            <a:prstGeom prst="rect">
+              <a:avLst/>
+            </a:prstGeom>
+            <a:noFill/>
+            <a:ln>
+              <a:solidFill>
+                <a:schemeClr val="tx1"/>
+              </a:solidFill>
+            </a:ln>
+          </p:spPr>
+          <p:style>
+            <a:lnRef idx="2">
+              <a:schemeClr val="accent1">
+                <a:shade val="50000"/>
+              </a:schemeClr>
+            </a:lnRef>
+            <a:fillRef idx="1">
+              <a:schemeClr val="accent1"/>
+            </a:fillRef>
+            <a:effectRef idx="0">
+              <a:schemeClr val="accent1"/>
+            </a:effectRef>
+            <a:fontRef idx="minor">
+              <a:schemeClr val="lt1"/>
+            </a:fontRef>
+          </p:style>
+          <p:txBody>
+            <a:bodyPr rtlCol="0" anchor="ctr"/>
+            <a:lstStyle/>
+            <a:p>
+              <a:pPr algn="ctr"/>
+              <a:r>
+                <a:rPr lang="en-US" altLang="ko-KR" dirty="0" smtClean="0">
+                  <a:solidFill>
+                    <a:schemeClr val="tx1"/>
+                  </a:solidFill>
+                </a:rPr>
+                <a:t>Bitcoin</a:t>
+              </a:r>
+              <a:endParaRPr lang="ko-KR" altLang="en-US" dirty="0">
+                <a:solidFill>
+                  <a:schemeClr val="tx1"/>
+                </a:solidFill>
+              </a:endParaRPr>
+            </a:p>
+          </p:txBody>
+        </p:sp>
+        <p:sp>
+          <p:nvSpPr>
+            <p:cNvPr id="24" name="직사각형 23"/>
+            <p:cNvSpPr/>
+            <p:nvPr/>
+          </p:nvSpPr>
+          <p:spPr>
+            <a:xfrm>
+              <a:off x="2727166" y="4599318"/>
+              <a:ext cx="1890589" cy="734171"/>
+            </a:xfrm>
+            <a:prstGeom prst="rect">
+              <a:avLst/>
+            </a:prstGeom>
+            <a:noFill/>
+            <a:ln>
+              <a:solidFill>
+                <a:schemeClr val="tx1"/>
+              </a:solidFill>
+            </a:ln>
+          </p:spPr>
+          <p:style>
+            <a:lnRef idx="2">
+              <a:schemeClr val="accent1">
+                <a:shade val="50000"/>
+              </a:schemeClr>
+            </a:lnRef>
+            <a:fillRef idx="1">
+              <a:schemeClr val="accent1"/>
+            </a:fillRef>
+            <a:effectRef idx="0">
+              <a:schemeClr val="accent1"/>
+            </a:effectRef>
+            <a:fontRef idx="minor">
+              <a:schemeClr val="lt1"/>
+            </a:fontRef>
+          </p:style>
+          <p:txBody>
+            <a:bodyPr rtlCol="0" anchor="ctr"/>
+            <a:lstStyle/>
+            <a:p>
+              <a:pPr algn="ctr"/>
+              <a:r>
+                <a:rPr lang="en-US" altLang="ko-KR" dirty="0" smtClean="0">
+                  <a:solidFill>
+                    <a:schemeClr val="tx1"/>
+                  </a:solidFill>
+                </a:rPr>
+                <a:t>Bitcoin -&gt; LDPC</a:t>
+              </a:r>
+              <a:endParaRPr lang="ko-KR" altLang="en-US" dirty="0">
+                <a:solidFill>
+                  <a:schemeClr val="tx1"/>
+                </a:solidFill>
+              </a:endParaRPr>
+            </a:p>
+          </p:txBody>
+        </p:sp>
+        <p:sp>
+          <p:nvSpPr>
+            <p:cNvPr id="25" name="직사각형 24"/>
+            <p:cNvSpPr/>
+            <p:nvPr/>
+          </p:nvSpPr>
+          <p:spPr>
+            <a:xfrm>
+              <a:off x="2727166" y="909913"/>
+              <a:ext cx="1890589" cy="734171"/>
+            </a:xfrm>
+            <a:prstGeom prst="rect">
+              <a:avLst/>
+            </a:prstGeom>
+            <a:noFill/>
+            <a:ln>
+              <a:solidFill>
+                <a:schemeClr val="tx1"/>
+              </a:solidFill>
+            </a:ln>
+          </p:spPr>
+          <p:style>
+            <a:lnRef idx="2">
+              <a:schemeClr val="accent1">
+                <a:shade val="50000"/>
+              </a:schemeClr>
+            </a:lnRef>
+            <a:fillRef idx="1">
+              <a:schemeClr val="accent1"/>
+            </a:fillRef>
+            <a:effectRef idx="0">
+              <a:schemeClr val="accent1"/>
+            </a:effectRef>
+            <a:fontRef idx="minor">
+              <a:schemeClr val="lt1"/>
+            </a:fontRef>
+          </p:style>
+          <p:txBody>
+            <a:bodyPr rtlCol="0" anchor="ctr"/>
+            <a:lstStyle/>
+            <a:p>
+              <a:pPr algn="ctr"/>
+              <a:r>
+                <a:rPr lang="en-US" altLang="ko-KR" dirty="0" smtClean="0">
+                  <a:solidFill>
+                    <a:schemeClr val="tx1"/>
+                  </a:solidFill>
+                </a:rPr>
+                <a:t>LDPC -&gt; Bitcoin</a:t>
+              </a:r>
+              <a:endParaRPr lang="ko-KR" altLang="en-US" dirty="0">
+                <a:solidFill>
+                  <a:schemeClr val="tx1"/>
+                </a:solidFill>
+              </a:endParaRPr>
+            </a:p>
+          </p:txBody>
+        </p:sp>
+        <p:cxnSp>
+          <p:nvCxnSpPr>
+            <p:cNvPr id="26" name="꺾인 연결선 25"/>
+            <p:cNvCxnSpPr>
+              <a:stCxn id="22" idx="2"/>
+              <a:endCxn id="24" idx="1"/>
+            </p:cNvCxnSpPr>
+            <p:nvPr/>
+          </p:nvCxnSpPr>
+          <p:spPr>
+            <a:xfrm rot="16200000" flipH="1">
+              <a:off x="1248683" y="3487920"/>
+              <a:ext cx="1555005" cy="1401961"/>
+            </a:xfrm>
+            <a:prstGeom prst="bentConnector2">
+              <a:avLst/>
+            </a:prstGeom>
+            <a:ln w="12700">
+              <a:tailEnd type="triangle"/>
+            </a:ln>
+          </p:spPr>
+          <p:style>
+            <a:lnRef idx="1">
+              <a:schemeClr val="dk1"/>
+            </a:lnRef>
+            <a:fillRef idx="0">
+              <a:schemeClr val="dk1"/>
+            </a:fillRef>
+            <a:effectRef idx="0">
+              <a:schemeClr val="dk1"/>
+            </a:effectRef>
+            <a:fontRef idx="minor">
+              <a:schemeClr val="tx1"/>
+            </a:fontRef>
+          </p:style>
+        </p:cxnSp>
+        <p:cxnSp>
+          <p:nvCxnSpPr>
+            <p:cNvPr id="28" name="꺾인 연결선 27"/>
+            <p:cNvCxnSpPr>
+              <a:stCxn id="24" idx="3"/>
+              <a:endCxn id="21" idx="2"/>
+            </p:cNvCxnSpPr>
+            <p:nvPr/>
+          </p:nvCxnSpPr>
+          <p:spPr>
+            <a:xfrm flipV="1">
+              <a:off x="4617755" y="3411399"/>
+              <a:ext cx="1331934" cy="1555005"/>
+            </a:xfrm>
+            <a:prstGeom prst="bentConnector2">
+              <a:avLst/>
+            </a:prstGeom>
+            <a:ln w="12700">
+              <a:tailEnd type="triangle"/>
+            </a:ln>
+          </p:spPr>
+          <p:style>
+            <a:lnRef idx="1">
+              <a:schemeClr val="dk1"/>
+            </a:lnRef>
+            <a:fillRef idx="0">
+              <a:schemeClr val="dk1"/>
+            </a:fillRef>
+            <a:effectRef idx="0">
+              <a:schemeClr val="dk1"/>
+            </a:effectRef>
+            <a:fontRef idx="minor">
+              <a:schemeClr val="tx1"/>
+            </a:fontRef>
+          </p:style>
+        </p:cxnSp>
+        <p:cxnSp>
+          <p:nvCxnSpPr>
+            <p:cNvPr id="30" name="꺾인 연결선 29"/>
+            <p:cNvCxnSpPr>
+              <a:stCxn id="21" idx="0"/>
+              <a:endCxn id="25" idx="3"/>
+            </p:cNvCxnSpPr>
+            <p:nvPr/>
+          </p:nvCxnSpPr>
+          <p:spPr>
+            <a:xfrm rot="16200000" flipV="1">
+              <a:off x="4580694" y="1314060"/>
+              <a:ext cx="1406056" cy="1331934"/>
+            </a:xfrm>
+            <a:prstGeom prst="bentConnector2">
+              <a:avLst/>
+            </a:prstGeom>
+            <a:ln w="12700">
+              <a:tailEnd type="triangle"/>
+            </a:ln>
+          </p:spPr>
+          <p:style>
+            <a:lnRef idx="1">
+              <a:schemeClr val="dk1"/>
+            </a:lnRef>
+            <a:fillRef idx="0">
+              <a:schemeClr val="dk1"/>
+            </a:fillRef>
+            <a:effectRef idx="0">
+              <a:schemeClr val="dk1"/>
+            </a:effectRef>
+            <a:fontRef idx="minor">
+              <a:schemeClr val="tx1"/>
+            </a:fontRef>
+          </p:style>
+        </p:cxnSp>
+        <p:cxnSp>
+          <p:nvCxnSpPr>
+            <p:cNvPr id="31" name="꺾인 연결선 30"/>
+            <p:cNvCxnSpPr>
+              <a:stCxn id="25" idx="1"/>
+              <a:endCxn id="22" idx="0"/>
+            </p:cNvCxnSpPr>
+            <p:nvPr/>
+          </p:nvCxnSpPr>
+          <p:spPr>
+            <a:xfrm rot="10800000" flipV="1">
+              <a:off x="1325206" y="1276999"/>
+              <a:ext cx="1401961" cy="1406056"/>
+            </a:xfrm>
+            <a:prstGeom prst="bentConnector2">
+              <a:avLst/>
+            </a:prstGeom>
+            <a:ln w="12700">
+              <a:tailEnd type="triangle"/>
+            </a:ln>
+          </p:spPr>
+          <p:style>
+            <a:lnRef idx="1">
+              <a:schemeClr val="dk1"/>
+            </a:lnRef>
+            <a:fillRef idx="0">
+              <a:schemeClr val="dk1"/>
+            </a:fillRef>
+            <a:effectRef idx="0">
+              <a:schemeClr val="dk1"/>
+            </a:effectRef>
+            <a:fontRef idx="minor">
+              <a:schemeClr val="tx1"/>
+            </a:fontRef>
+          </p:style>
+        </p:cxnSp>
+      </p:grpSp>
+    </p:spTree>
+    <p:extLst>
+      <p:ext uri="{BB962C8B-B14F-4D97-AF65-F5344CB8AC3E}">
+        <p14:creationId xmlns:p14="http://schemas.microsoft.com/office/powerpoint/2010/main" val="1904733449"/>
+      </p:ext>
+    </p:extLst>
+  </p:cSld>
+  <p:clrMapOvr>
+    <a:masterClrMapping/>
+  </p:clrMapOvr>
 </p:sld>
 </file>
 

</xml_diff>